<commit_message>
CRUD Done for Ordering microservice..
</commit_message>
<xml_diff>
--- a/Documents/SOLID.pptx
+++ b/Documents/SOLID.pptx
@@ -252,7 +252,7 @@
   </p:defaultTextStyle>
   <p:extLst>
     <p:ext uri="{EFAFB233-063F-42B5-8137-9DF3F51BA10A}">
-      <p15:sldGuideLst xmlns:ahyp="http://schemas.microsoft.com/office/drawing/2018/hyperlinkcolor" xmlns:p15="http://schemas.microsoft.com/office/powerpoint/2012/main" xmlns:p14="http://schemas.microsoft.com/office/powerpoint/2010/main" xmlns:com="http://schemas.openxmlformats.org/drawingml/2006/compatibility" xmlns:pvml="urn:schemas-microsoft-com:office:powerpoint" xmlns:v="urn:schemas-microsoft-com:vml" xmlns:o="urn:schemas-microsoft-com:office:office" xmlns:dgm="http://schemas.openxmlformats.org/drawingml/2006/diagram" xmlns:c="http://schemas.openxmlformats.org/drawingml/2006/chart" xmlns:mv="urn:schemas-microsoft-com:mac:vml" xmlns:mc="http://schemas.openxmlformats.org/markup-compatibility/2006" xmlns="">
+      <p15:sldGuideLst xmlns="" xmlns:mc="http://schemas.openxmlformats.org/markup-compatibility/2006" xmlns:mv="urn:schemas-microsoft-com:mac:vml" xmlns:c="http://schemas.openxmlformats.org/drawingml/2006/chart" xmlns:dgm="http://schemas.openxmlformats.org/drawingml/2006/diagram" xmlns:o="urn:schemas-microsoft-com:office:office" xmlns:v="urn:schemas-microsoft-com:vml" xmlns:pvml="urn:schemas-microsoft-com:office:powerpoint" xmlns:com="http://schemas.openxmlformats.org/drawingml/2006/compatibility" xmlns:p14="http://schemas.microsoft.com/office/powerpoint/2010/main" xmlns:p15="http://schemas.microsoft.com/office/powerpoint/2012/main" xmlns:ahyp="http://schemas.microsoft.com/office/drawing/2018/hyperlinkcolor">
         <p15:guide id="1" orient="horz" pos="2160">
           <p15:clr>
             <a:srgbClr val="A4A3A4"/>
@@ -266,7 +266,7 @@
       </p15:sldGuideLst>
     </p:ext>
     <p:ext uri="GoogleSlidesCustomDataVersion2">
-      <go:slidesCustomData xmlns:go="http://customooxmlschemas.google.com/" xmlns:ahyp="http://schemas.microsoft.com/office/drawing/2018/hyperlinkcolor" xmlns:p15="http://schemas.microsoft.com/office/powerpoint/2012/main" xmlns:p14="http://schemas.microsoft.com/office/powerpoint/2010/main" xmlns:com="http://schemas.openxmlformats.org/drawingml/2006/compatibility" xmlns:pvml="urn:schemas-microsoft-com:office:powerpoint" xmlns:v="urn:schemas-microsoft-com:vml" xmlns:o="urn:schemas-microsoft-com:office:office" xmlns:dgm="http://schemas.openxmlformats.org/drawingml/2006/diagram" xmlns:c="http://schemas.openxmlformats.org/drawingml/2006/chart" xmlns:mv="urn:schemas-microsoft-com:mac:vml" xmlns:mc="http://schemas.openxmlformats.org/markup-compatibility/2006" xmlns="" r:id="rId16" roundtripDataSignature="AMtx7miq7V0AbB7HNw3A2z0kllOTtIkHgg=="/>
+      <go:slidesCustomData xmlns="" xmlns:mc="http://schemas.openxmlformats.org/markup-compatibility/2006" xmlns:mv="urn:schemas-microsoft-com:mac:vml" xmlns:c="http://schemas.openxmlformats.org/drawingml/2006/chart" xmlns:dgm="http://schemas.openxmlformats.org/drawingml/2006/diagram" xmlns:o="urn:schemas-microsoft-com:office:office" xmlns:v="urn:schemas-microsoft-com:vml" xmlns:pvml="urn:schemas-microsoft-com:office:powerpoint" xmlns:com="http://schemas.openxmlformats.org/drawingml/2006/compatibility" xmlns:p14="http://schemas.microsoft.com/office/powerpoint/2010/main" xmlns:p15="http://schemas.microsoft.com/office/powerpoint/2012/main" xmlns:ahyp="http://schemas.microsoft.com/office/drawing/2018/hyperlinkcolor" xmlns:go="http://customooxmlschemas.google.com/" r:id="rId16" roundtripDataSignature="AMtx7miq7V0AbB7HNw3A2z0kllOTtIkHgg=="/>
     </p:ext>
   </p:extLst>
 </p:presentation>
@@ -23358,10 +23358,10 @@
               <a:buNone/>
             </a:pPr>
             <a:r>
-              <a:rPr lang="en-US" b="1"/>
+              <a:rPr lang="en-US" b="1" dirty="0"/>
               <a:t>Open-closed Principle (OCP)</a:t>
             </a:r>
-            <a:endParaRPr b="1"/>
+            <a:endParaRPr b="1" dirty="0"/>
           </a:p>
         </p:txBody>
       </p:sp>
@@ -23415,90 +23415,105 @@
           </a:p>
         </p:txBody>
       </p:sp>
-      <p:pic>
-        <p:nvPicPr>
-          <p:cNvPr id="170" name="Google Shape;170;g2315e7a7f5d_0_7"/>
-          <p:cNvPicPr preferRelativeResize="0"/>
+      <p:grpSp>
+        <p:nvGrpSpPr>
+          <p:cNvPr id="2" name="Group 1"/>
+          <p:cNvGrpSpPr/>
           <p:nvPr/>
-        </p:nvPicPr>
-        <p:blipFill>
-          <a:blip r:embed="rId3">
-            <a:alphaModFix/>
-          </a:blip>
-          <a:stretch>
-            <a:fillRect/>
-          </a:stretch>
-        </p:blipFill>
-        <p:spPr>
+        </p:nvGrpSpPr>
+        <p:grpSpPr>
           <a:xfrm>
             <a:off x="5732225" y="3893775"/>
-            <a:ext cx="1519578" cy="1188486"/>
+            <a:ext cx="3652650" cy="2531475"/>
+            <a:chOff x="5732225" y="3893775"/>
+            <a:chExt cx="3652650" cy="2531475"/>
           </a:xfrm>
-          <a:prstGeom prst="rect">
-            <a:avLst/>
-          </a:prstGeom>
-          <a:noFill/>
-          <a:ln>
+        </p:grpSpPr>
+        <p:pic>
+          <p:nvPicPr>
+            <p:cNvPr id="170" name="Google Shape;170;g2315e7a7f5d_0_7"/>
+            <p:cNvPicPr preferRelativeResize="0"/>
+            <p:nvPr/>
+          </p:nvPicPr>
+          <p:blipFill>
+            <a:blip r:embed="rId3">
+              <a:alphaModFix/>
+            </a:blip>
+            <a:stretch>
+              <a:fillRect/>
+            </a:stretch>
+          </p:blipFill>
+          <p:spPr>
+            <a:xfrm>
+              <a:off x="5732225" y="3893775"/>
+              <a:ext cx="1519578" cy="1188486"/>
+            </a:xfrm>
+            <a:prstGeom prst="rect">
+              <a:avLst/>
+            </a:prstGeom>
             <a:noFill/>
-          </a:ln>
-        </p:spPr>
-      </p:pic>
-      <p:pic>
-        <p:nvPicPr>
-          <p:cNvPr id="171" name="Google Shape;171;g2315e7a7f5d_0_7"/>
-          <p:cNvPicPr preferRelativeResize="0"/>
-          <p:nvPr/>
-        </p:nvPicPr>
-        <p:blipFill>
-          <a:blip r:embed="rId4">
-            <a:alphaModFix/>
-          </a:blip>
-          <a:stretch>
-            <a:fillRect/>
-          </a:stretch>
-        </p:blipFill>
-        <p:spPr>
-          <a:xfrm>
-            <a:off x="5732225" y="5272419"/>
-            <a:ext cx="2029250" cy="1152831"/>
-          </a:xfrm>
-          <a:prstGeom prst="rect">
-            <a:avLst/>
-          </a:prstGeom>
-          <a:noFill/>
-          <a:ln>
+            <a:ln>
+              <a:noFill/>
+            </a:ln>
+          </p:spPr>
+        </p:pic>
+        <p:pic>
+          <p:nvPicPr>
+            <p:cNvPr id="171" name="Google Shape;171;g2315e7a7f5d_0_7"/>
+            <p:cNvPicPr preferRelativeResize="0"/>
+            <p:nvPr/>
+          </p:nvPicPr>
+          <p:blipFill>
+            <a:blip r:embed="rId4">
+              <a:alphaModFix/>
+            </a:blip>
+            <a:stretch>
+              <a:fillRect/>
+            </a:stretch>
+          </p:blipFill>
+          <p:spPr>
+            <a:xfrm>
+              <a:off x="5732225" y="5272419"/>
+              <a:ext cx="2029250" cy="1152831"/>
+            </a:xfrm>
+            <a:prstGeom prst="rect">
+              <a:avLst/>
+            </a:prstGeom>
             <a:noFill/>
-          </a:ln>
-        </p:spPr>
-      </p:pic>
-      <p:pic>
-        <p:nvPicPr>
-          <p:cNvPr id="172" name="Google Shape;172;g2315e7a7f5d_0_7"/>
-          <p:cNvPicPr preferRelativeResize="0"/>
-          <p:nvPr/>
-        </p:nvPicPr>
-        <p:blipFill>
-          <a:blip r:embed="rId5">
-            <a:alphaModFix/>
-          </a:blip>
-          <a:stretch>
-            <a:fillRect/>
-          </a:stretch>
-        </p:blipFill>
-        <p:spPr>
-          <a:xfrm>
-            <a:off x="7912489" y="3893775"/>
-            <a:ext cx="1472386" cy="831940"/>
-          </a:xfrm>
-          <a:prstGeom prst="rect">
-            <a:avLst/>
-          </a:prstGeom>
-          <a:noFill/>
-          <a:ln>
+            <a:ln>
+              <a:noFill/>
+            </a:ln>
+          </p:spPr>
+        </p:pic>
+        <p:pic>
+          <p:nvPicPr>
+            <p:cNvPr id="172" name="Google Shape;172;g2315e7a7f5d_0_7"/>
+            <p:cNvPicPr preferRelativeResize="0"/>
+            <p:nvPr/>
+          </p:nvPicPr>
+          <p:blipFill>
+            <a:blip r:embed="rId5">
+              <a:alphaModFix/>
+            </a:blip>
+            <a:stretch>
+              <a:fillRect/>
+            </a:stretch>
+          </p:blipFill>
+          <p:spPr>
+            <a:xfrm>
+              <a:off x="7912489" y="3893775"/>
+              <a:ext cx="1472386" cy="831940"/>
+            </a:xfrm>
+            <a:prstGeom prst="rect">
+              <a:avLst/>
+            </a:prstGeom>
             <a:noFill/>
-          </a:ln>
-        </p:spPr>
-      </p:pic>
+            <a:ln>
+              <a:noFill/>
+            </a:ln>
+          </p:spPr>
+        </p:pic>
+      </p:grpSp>
     </p:spTree>
   </p:cSld>
   <p:clrMapOvr>
@@ -23652,7 +23667,7 @@
                                           </p:stCondLst>
                                         </p:cTn>
                                         <p:tgtEl>
-                                          <p:spTgt spid="170"/>
+                                          <p:spTgt spid="2"/>
                                         </p:tgtEl>
                                         <p:attrNameLst>
                                           <p:attrName>style.visibility</p:attrName>
@@ -23666,7 +23681,7 @@
                                       <p:cBhvr>
                                         <p:cTn id="17" dur="500"/>
                                         <p:tgtEl>
-                                          <p:spTgt spid="170"/>
+                                          <p:spTgt spid="2"/>
                                         </p:tgtEl>
                                       </p:cBhvr>
                                     </p:animEffect>

</xml_diff>